<commit_message>
update slides for Tutorial 3
</commit_message>
<xml_diff>
--- a/CS3210-TL6.pptx
+++ b/CS3210-TL6.pptx
@@ -67,32 +67,25 @@
   <p:notesSz cx="6858000" cy="9144000"/>
   <p:embeddedFontLst>
     <p:embeddedFont>
-      <p:font typeface="Calibri" panose="020F0502020204030204" pitchFamily="34" charset="0"/>
+      <p:font typeface="Consolas" panose="020B0609020204030204" pitchFamily="49" charset="0"/>
       <p:regular r:id="rId57"/>
       <p:bold r:id="rId58"/>
       <p:italic r:id="rId59"/>
       <p:boldItalic r:id="rId60"/>
     </p:embeddedFont>
     <p:embeddedFont>
-      <p:font typeface="Consolas" panose="020B0609020204030204" pitchFamily="49" charset="0"/>
+      <p:font typeface="PT Serif" panose="020A0603040505020204" pitchFamily="18" charset="77"/>
       <p:regular r:id="rId61"/>
       <p:bold r:id="rId62"/>
       <p:italic r:id="rId63"/>
       <p:boldItalic r:id="rId64"/>
     </p:embeddedFont>
     <p:embeddedFont>
-      <p:font typeface="PT Serif" panose="020B0604020202020204" charset="0"/>
+      <p:font typeface="Quattrocento Sans" panose="020B0502050000020003" pitchFamily="34" charset="0"/>
       <p:regular r:id="rId65"/>
       <p:bold r:id="rId66"/>
       <p:italic r:id="rId67"/>
       <p:boldItalic r:id="rId68"/>
-    </p:embeddedFont>
-    <p:embeddedFont>
-      <p:font typeface="Quattrocento Sans" panose="020B0604020202020204" charset="0"/>
-      <p:regular r:id="rId69"/>
-      <p:bold r:id="rId70"/>
-      <p:italic r:id="rId71"/>
-      <p:boldItalic r:id="rId72"/>
     </p:embeddedFont>
   </p:embeddedFontLst>
   <p:defaultTextStyle>
@@ -345,6 +338,30 @@
 
 <file path=ppt/changesInfos/changesInfo1.xml><?xml version="1.0" encoding="utf-8"?>
 <pc:chgInfo xmlns:a="http://schemas.openxmlformats.org/drawingml/2006/main" xmlns:r="http://schemas.openxmlformats.org/officeDocument/2006/relationships" xmlns:ac="http://schemas.microsoft.com/office/drawing/2013/main/command" xmlns:pc="http://schemas.microsoft.com/office/powerpoint/2013/main/command">
+  <pc:docChgLst>
+    <pc:chgData name="Liu Changxi" userId="bf23ac5e-c2b4-476a-ac23-169a0c8c5211" providerId="ADAL" clId="{229A9FE4-61D6-6A4F-B482-278D6487ABF1}"/>
+    <pc:docChg chg="modSld">
+      <pc:chgData name="Liu Changxi" userId="bf23ac5e-c2b4-476a-ac23-169a0c8c5211" providerId="ADAL" clId="{229A9FE4-61D6-6A4F-B482-278D6487ABF1}" dt="2024-10-10T06:00:40.308" v="6" actId="20577"/>
+      <pc:docMkLst>
+        <pc:docMk/>
+      </pc:docMkLst>
+      <pc:sldChg chg="modSp mod">
+        <pc:chgData name="Liu Changxi" userId="bf23ac5e-c2b4-476a-ac23-169a0c8c5211" providerId="ADAL" clId="{229A9FE4-61D6-6A4F-B482-278D6487ABF1}" dt="2024-10-10T06:00:40.308" v="6" actId="20577"/>
+        <pc:sldMkLst>
+          <pc:docMk/>
+          <pc:sldMk cId="255030729" sldId="311"/>
+        </pc:sldMkLst>
+        <pc:spChg chg="mod">
+          <ac:chgData name="Liu Changxi" userId="bf23ac5e-c2b4-476a-ac23-169a0c8c5211" providerId="ADAL" clId="{229A9FE4-61D6-6A4F-B482-278D6487ABF1}" dt="2024-10-10T06:00:40.308" v="6" actId="20577"/>
+          <ac:spMkLst>
+            <pc:docMk/>
+            <pc:sldMk cId="255030729" sldId="311"/>
+            <ac:spMk id="2" creationId="{2391A897-AE0A-48E1-BCB4-70B35B294F7E}"/>
+          </ac:spMkLst>
+        </pc:spChg>
+      </pc:sldChg>
+    </pc:docChg>
+  </pc:docChgLst>
   <pc:docChgLst>
     <pc:chgData name="Liu Changxi" userId="bf23ac5e-c2b4-476a-ac23-169a0c8c5211" providerId="ADAL" clId="{9FB6B766-444D-483B-B446-ACFACA4ACAF6}"/>
     <pc:docChg chg="undo custSel addSld delSld modSld">
@@ -54689,8 +54706,20 @@
               <a:t>fastly</a:t>
             </a:r>
             <a:r>
+              <a:rPr lang="en-US"/>
+              <a:t> use </a:t>
+            </a:r>
+            <a:r>
+              <a:rPr lang="en-US" altLang="zh-CN" dirty="0"/>
+              <a:t>G</a:t>
+            </a:r>
+            <a:r>
+              <a:rPr lang="en-US"/>
+              <a:t>PU </a:t>
+            </a:r>
+            <a:r>
               <a:rPr lang="en-US" dirty="0"/>
-              <a:t> using GPU to accelerate your applications?</a:t>
+              <a:t>to accelerate your applications?</a:t>
             </a:r>
           </a:p>
         </p:txBody>

</xml_diff>